<commit_message>
small change to presentation
</commit_message>
<xml_diff>
--- a/Final Project Presentation.pptx
+++ b/Final Project Presentation.pptx
@@ -114,6 +114,11 @@
       </a:defRPr>
     </a:lvl9pPr>
   </p:defaultTextStyle>
+  <p:extLst>
+    <p:ext uri="{EFAFB233-063F-42B5-8137-9DF3F51BA10A}">
+      <p15:sldGuideLst xmlns:p15="http://schemas.microsoft.com/office/powerpoint/2012/main"/>
+    </p:ext>
+  </p:extLst>
 </p:presentation>
 </file>
 
@@ -1245,6 +1250,13 @@
         </dgm:presLayoutVars>
       </dgm:prSet>
       <dgm:spPr/>
+      <dgm:t>
+        <a:bodyPr/>
+        <a:lstStyle/>
+        <a:p>
+          <a:endParaRPr lang="en-US"/>
+        </a:p>
+      </dgm:t>
     </dgm:pt>
     <dgm:pt modelId="{1A997CB2-B3EC-CD40-AF6B-7DFCB218400A}" type="pres">
       <dgm:prSet presAssocID="{C9C4FF6F-4174-466A-898F-03766B7A2E5F}" presName="parentText" presStyleLbl="node1" presStyleIdx="0" presStyleCnt="4">
@@ -1254,6 +1266,13 @@
         </dgm:presLayoutVars>
       </dgm:prSet>
       <dgm:spPr/>
+      <dgm:t>
+        <a:bodyPr/>
+        <a:lstStyle/>
+        <a:p>
+          <a:endParaRPr lang="en-US"/>
+        </a:p>
+      </dgm:t>
     </dgm:pt>
     <dgm:pt modelId="{2A487DC9-50FE-FF47-BC4D-6F0CFE62C65D}" type="pres">
       <dgm:prSet presAssocID="{8C394DBB-48EA-47E7-A5F9-B8E1F4F11CC0}" presName="spacer" presStyleCnt="0"/>
@@ -1267,6 +1286,13 @@
         </dgm:presLayoutVars>
       </dgm:prSet>
       <dgm:spPr/>
+      <dgm:t>
+        <a:bodyPr/>
+        <a:lstStyle/>
+        <a:p>
+          <a:endParaRPr lang="en-US"/>
+        </a:p>
+      </dgm:t>
     </dgm:pt>
     <dgm:pt modelId="{D4AF4DA4-35D6-994D-9030-C17F1EC9C8F4}" type="pres">
       <dgm:prSet presAssocID="{A0CB572C-D703-4609-BC0C-F462EFD2F91B}" presName="childText" presStyleLbl="revTx" presStyleIdx="0" presStyleCnt="3">
@@ -1275,6 +1301,13 @@
         </dgm:presLayoutVars>
       </dgm:prSet>
       <dgm:spPr/>
+      <dgm:t>
+        <a:bodyPr/>
+        <a:lstStyle/>
+        <a:p>
+          <a:endParaRPr lang="en-US"/>
+        </a:p>
+      </dgm:t>
     </dgm:pt>
     <dgm:pt modelId="{B3AB5110-CBFC-2343-B87B-7CF7F2578D03}" type="pres">
       <dgm:prSet presAssocID="{0DC7E88B-E145-416E-9E73-655B9C5157BE}" presName="parentText" presStyleLbl="node1" presStyleIdx="2" presStyleCnt="4">
@@ -1284,6 +1317,13 @@
         </dgm:presLayoutVars>
       </dgm:prSet>
       <dgm:spPr/>
+      <dgm:t>
+        <a:bodyPr/>
+        <a:lstStyle/>
+        <a:p>
+          <a:endParaRPr lang="en-US"/>
+        </a:p>
+      </dgm:t>
     </dgm:pt>
     <dgm:pt modelId="{550DEF02-70DB-B748-A914-D87566336A95}" type="pres">
       <dgm:prSet presAssocID="{0DC7E88B-E145-416E-9E73-655B9C5157BE}" presName="childText" presStyleLbl="revTx" presStyleIdx="1" presStyleCnt="3">
@@ -1292,6 +1332,13 @@
         </dgm:presLayoutVars>
       </dgm:prSet>
       <dgm:spPr/>
+      <dgm:t>
+        <a:bodyPr/>
+        <a:lstStyle/>
+        <a:p>
+          <a:endParaRPr lang="en-US"/>
+        </a:p>
+      </dgm:t>
     </dgm:pt>
     <dgm:pt modelId="{A881D8CB-4AA7-1F49-ADC5-604A0B7E595E}" type="pres">
       <dgm:prSet presAssocID="{93FFD56E-ACE3-4AFE-B907-E8521AC8491C}" presName="parentText" presStyleLbl="node1" presStyleIdx="3" presStyleCnt="4">
@@ -1301,6 +1348,13 @@
         </dgm:presLayoutVars>
       </dgm:prSet>
       <dgm:spPr/>
+      <dgm:t>
+        <a:bodyPr/>
+        <a:lstStyle/>
+        <a:p>
+          <a:endParaRPr lang="en-US"/>
+        </a:p>
+      </dgm:t>
     </dgm:pt>
     <dgm:pt modelId="{F23D7B96-E391-EA49-8A28-33DB4594A35D}" type="pres">
       <dgm:prSet presAssocID="{93FFD56E-ACE3-4AFE-B907-E8521AC8491C}" presName="childText" presStyleLbl="revTx" presStyleIdx="2" presStyleCnt="3">
@@ -1309,26 +1363,33 @@
         </dgm:presLayoutVars>
       </dgm:prSet>
       <dgm:spPr/>
+      <dgm:t>
+        <a:bodyPr/>
+        <a:lstStyle/>
+        <a:p>
+          <a:endParaRPr lang="en-US"/>
+        </a:p>
+      </dgm:t>
     </dgm:pt>
   </dgm:ptLst>
   <dgm:cxnLst>
+    <dgm:cxn modelId="{30403D7C-DCC1-A848-9389-1BE51A0ED501}" type="presOf" srcId="{A0CB572C-D703-4609-BC0C-F462EFD2F91B}" destId="{1632DD7E-BEBD-F241-9BFD-6A524AA43AC9}" srcOrd="0" destOrd="0" presId="urn:microsoft.com/office/officeart/2005/8/layout/vList2"/>
+    <dgm:cxn modelId="{244B3DC9-5CB1-784C-958D-04B276515DE1}" type="presOf" srcId="{C9C4FF6F-4174-466A-898F-03766B7A2E5F}" destId="{1A997CB2-B3EC-CD40-AF6B-7DFCB218400A}" srcOrd="0" destOrd="0" presId="urn:microsoft.com/office/officeart/2005/8/layout/vList2"/>
+    <dgm:cxn modelId="{216B9260-1FAE-E84E-89EF-CF26F825A373}" type="presOf" srcId="{C3650AAD-11D0-4982-93CF-A45EB59C8DCC}" destId="{D4AF4DA4-35D6-994D-9030-C17F1EC9C8F4}" srcOrd="0" destOrd="0" presId="urn:microsoft.com/office/officeart/2005/8/layout/vList2"/>
+    <dgm:cxn modelId="{1CA958D1-62C1-4A47-8E26-1C261BDB6B59}" type="presOf" srcId="{93FFD56E-ACE3-4AFE-B907-E8521AC8491C}" destId="{A881D8CB-4AA7-1F49-ADC5-604A0B7E595E}" srcOrd="0" destOrd="0" presId="urn:microsoft.com/office/officeart/2005/8/layout/vList2"/>
+    <dgm:cxn modelId="{2FB26EF0-A250-2141-ACF9-EE62897160DC}" type="presOf" srcId="{A405643D-9DC9-4D99-811F-34DEE74B5A6D}" destId="{D4AF4DA4-35D6-994D-9030-C17F1EC9C8F4}" srcOrd="0" destOrd="1" presId="urn:microsoft.com/office/officeart/2005/8/layout/vList2"/>
+    <dgm:cxn modelId="{4FA67C90-889E-D841-9388-A0A73F6FB011}" type="presOf" srcId="{FE19C29F-6E66-482C-992E-A4F090511DD2}" destId="{F23D7B96-E391-EA49-8A28-33DB4594A35D}" srcOrd="0" destOrd="0" presId="urn:microsoft.com/office/officeart/2005/8/layout/vList2"/>
+    <dgm:cxn modelId="{BD01EC94-D142-4991-B945-7297FCCE0305}" srcId="{93FFD56E-ACE3-4AFE-B907-E8521AC8491C}" destId="{FE19C29F-6E66-482C-992E-A4F090511DD2}" srcOrd="0" destOrd="0" parTransId="{FF605BD7-4BF6-4F27-B642-40B0C422960A}" sibTransId="{6639787E-9E53-4D30-935F-DB7F539E59B3}"/>
     <dgm:cxn modelId="{F2625510-5396-4F7B-A47A-3381DFA6B841}" srcId="{0C696D6B-E07D-4878-80FC-A2044EB8DE7F}" destId="{A0CB572C-D703-4609-BC0C-F462EFD2F91B}" srcOrd="1" destOrd="0" parTransId="{99FB08EA-B4A0-42C6-8E7A-1AC9415B9C1C}" sibTransId="{C27FAB65-5E4F-4873-B696-16D37DD97865}"/>
-    <dgm:cxn modelId="{744DF110-432D-47AA-AAF0-65582614DBEB}" srcId="{0C696D6B-E07D-4878-80FC-A2044EB8DE7F}" destId="{C9C4FF6F-4174-466A-898F-03766B7A2E5F}" srcOrd="0" destOrd="0" parTransId="{ADA71F84-76AA-469B-AFD1-967EDD922B08}" sibTransId="{8C394DBB-48EA-47E7-A5F9-B8E1F4F11CC0}"/>
-    <dgm:cxn modelId="{3424A01A-D775-4754-AC06-3D0EB0D7708F}" srcId="{A0CB572C-D703-4609-BC0C-F462EFD2F91B}" destId="{A405643D-9DC9-4D99-811F-34DEE74B5A6D}" srcOrd="1" destOrd="0" parTransId="{465F3D0F-2190-482A-A4B6-CC16E1429EC2}" sibTransId="{BFFBA85E-EF10-4BDF-92B8-9B95515F962D}"/>
     <dgm:cxn modelId="{FFC0B13B-6A68-B940-8F9C-D80EB2555D7C}" type="presOf" srcId="{0C696D6B-E07D-4878-80FC-A2044EB8DE7F}" destId="{A4AFE9B6-C1E8-C44E-BB79-2DF86C9B2759}" srcOrd="0" destOrd="0" presId="urn:microsoft.com/office/officeart/2005/8/layout/vList2"/>
     <dgm:cxn modelId="{96F81A4C-0966-402C-BF33-A72972B137D9}" srcId="{0C696D6B-E07D-4878-80FC-A2044EB8DE7F}" destId="{0DC7E88B-E145-416E-9E73-655B9C5157BE}" srcOrd="2" destOrd="0" parTransId="{ED779971-8060-4A6E-94CD-E78F9BE8C8E7}" sibTransId="{E2855B28-3B37-4D41-A4A3-96702EBB1685}"/>
-    <dgm:cxn modelId="{216B9260-1FAE-E84E-89EF-CF26F825A373}" type="presOf" srcId="{C3650AAD-11D0-4982-93CF-A45EB59C8DCC}" destId="{D4AF4DA4-35D6-994D-9030-C17F1EC9C8F4}" srcOrd="0" destOrd="0" presId="urn:microsoft.com/office/officeart/2005/8/layout/vList2"/>
-    <dgm:cxn modelId="{30403D7C-DCC1-A848-9389-1BE51A0ED501}" type="presOf" srcId="{A0CB572C-D703-4609-BC0C-F462EFD2F91B}" destId="{1632DD7E-BEBD-F241-9BFD-6A524AA43AC9}" srcOrd="0" destOrd="0" presId="urn:microsoft.com/office/officeart/2005/8/layout/vList2"/>
-    <dgm:cxn modelId="{4FA67C90-889E-D841-9388-A0A73F6FB011}" type="presOf" srcId="{FE19C29F-6E66-482C-992E-A4F090511DD2}" destId="{F23D7B96-E391-EA49-8A28-33DB4594A35D}" srcOrd="0" destOrd="0" presId="urn:microsoft.com/office/officeart/2005/8/layout/vList2"/>
+    <dgm:cxn modelId="{744DF110-432D-47AA-AAF0-65582614DBEB}" srcId="{0C696D6B-E07D-4878-80FC-A2044EB8DE7F}" destId="{C9C4FF6F-4174-466A-898F-03766B7A2E5F}" srcOrd="0" destOrd="0" parTransId="{ADA71F84-76AA-469B-AFD1-967EDD922B08}" sibTransId="{8C394DBB-48EA-47E7-A5F9-B8E1F4F11CC0}"/>
+    <dgm:cxn modelId="{7B6B3E99-3959-0047-B578-E4E98141A47A}" type="presOf" srcId="{0DC7E88B-E145-416E-9E73-655B9C5157BE}" destId="{B3AB5110-CBFC-2343-B87B-7CF7F2578D03}" srcOrd="0" destOrd="0" presId="urn:microsoft.com/office/officeart/2005/8/layout/vList2"/>
+    <dgm:cxn modelId="{FC1286E1-7449-7843-8877-D6C5F7F8DF70}" type="presOf" srcId="{7156555E-E38B-6B43-BD0F-68434FA892F7}" destId="{550DEF02-70DB-B748-A914-D87566336A95}" srcOrd="0" destOrd="0" presId="urn:microsoft.com/office/officeart/2005/8/layout/vList2"/>
     <dgm:cxn modelId="{269EC590-9E81-4AD8-8042-5ABA67002F04}" srcId="{A0CB572C-D703-4609-BC0C-F462EFD2F91B}" destId="{C3650AAD-11D0-4982-93CF-A45EB59C8DCC}" srcOrd="0" destOrd="0" parTransId="{915BF3CE-7210-43BC-AE9D-7B627AD167C7}" sibTransId="{E787E449-F0A5-4FCB-87EB-150A274AA4B4}"/>
-    <dgm:cxn modelId="{BD01EC94-D142-4991-B945-7297FCCE0305}" srcId="{93FFD56E-ACE3-4AFE-B907-E8521AC8491C}" destId="{FE19C29F-6E66-482C-992E-A4F090511DD2}" srcOrd="0" destOrd="0" parTransId="{FF605BD7-4BF6-4F27-B642-40B0C422960A}" sibTransId="{6639787E-9E53-4D30-935F-DB7F539E59B3}"/>
-    <dgm:cxn modelId="{7B6B3E99-3959-0047-B578-E4E98141A47A}" type="presOf" srcId="{0DC7E88B-E145-416E-9E73-655B9C5157BE}" destId="{B3AB5110-CBFC-2343-B87B-7CF7F2578D03}" srcOrd="0" destOrd="0" presId="urn:microsoft.com/office/officeart/2005/8/layout/vList2"/>
+    <dgm:cxn modelId="{E62882FF-155A-4FE0-8920-31E80F97A6E6}" srcId="{0C696D6B-E07D-4878-80FC-A2044EB8DE7F}" destId="{93FFD56E-ACE3-4AFE-B907-E8521AC8491C}" srcOrd="3" destOrd="0" parTransId="{AE70F945-422E-4BD9-AADA-591276176941}" sibTransId="{9C5338EB-8208-4022-A54F-00F443C376F0}"/>
+    <dgm:cxn modelId="{3424A01A-D775-4754-AC06-3D0EB0D7708F}" srcId="{A0CB572C-D703-4609-BC0C-F462EFD2F91B}" destId="{A405643D-9DC9-4D99-811F-34DEE74B5A6D}" srcOrd="1" destOrd="0" parTransId="{465F3D0F-2190-482A-A4B6-CC16E1429EC2}" sibTransId="{BFFBA85E-EF10-4BDF-92B8-9B95515F962D}"/>
     <dgm:cxn modelId="{39F500A1-ED3D-7145-8627-DFFC759ACE49}" srcId="{0DC7E88B-E145-416E-9E73-655B9C5157BE}" destId="{7156555E-E38B-6B43-BD0F-68434FA892F7}" srcOrd="0" destOrd="0" parTransId="{633301E6-A1DB-B445-83DB-F37101BF2B88}" sibTransId="{0BEA3AFD-2790-814C-9D7C-E6E415D2BB23}"/>
-    <dgm:cxn modelId="{244B3DC9-5CB1-784C-958D-04B276515DE1}" type="presOf" srcId="{C9C4FF6F-4174-466A-898F-03766B7A2E5F}" destId="{1A997CB2-B3EC-CD40-AF6B-7DFCB218400A}" srcOrd="0" destOrd="0" presId="urn:microsoft.com/office/officeart/2005/8/layout/vList2"/>
-    <dgm:cxn modelId="{1CA958D1-62C1-4A47-8E26-1C261BDB6B59}" type="presOf" srcId="{93FFD56E-ACE3-4AFE-B907-E8521AC8491C}" destId="{A881D8CB-4AA7-1F49-ADC5-604A0B7E595E}" srcOrd="0" destOrd="0" presId="urn:microsoft.com/office/officeart/2005/8/layout/vList2"/>
-    <dgm:cxn modelId="{FC1286E1-7449-7843-8877-D6C5F7F8DF70}" type="presOf" srcId="{7156555E-E38B-6B43-BD0F-68434FA892F7}" destId="{550DEF02-70DB-B748-A914-D87566336A95}" srcOrd="0" destOrd="0" presId="urn:microsoft.com/office/officeart/2005/8/layout/vList2"/>
-    <dgm:cxn modelId="{2FB26EF0-A250-2141-ACF9-EE62897160DC}" type="presOf" srcId="{A405643D-9DC9-4D99-811F-34DEE74B5A6D}" destId="{D4AF4DA4-35D6-994D-9030-C17F1EC9C8F4}" srcOrd="0" destOrd="1" presId="urn:microsoft.com/office/officeart/2005/8/layout/vList2"/>
-    <dgm:cxn modelId="{E62882FF-155A-4FE0-8920-31E80F97A6E6}" srcId="{0C696D6B-E07D-4878-80FC-A2044EB8DE7F}" destId="{93FFD56E-ACE3-4AFE-B907-E8521AC8491C}" srcOrd="3" destOrd="0" parTransId="{AE70F945-422E-4BD9-AADA-591276176941}" sibTransId="{9C5338EB-8208-4022-A54F-00F443C376F0}"/>
     <dgm:cxn modelId="{EAF14C00-1126-864E-8510-F20028D4BAAE}" type="presParOf" srcId="{A4AFE9B6-C1E8-C44E-BB79-2DF86C9B2759}" destId="{1A997CB2-B3EC-CD40-AF6B-7DFCB218400A}" srcOrd="0" destOrd="0" presId="urn:microsoft.com/office/officeart/2005/8/layout/vList2"/>
     <dgm:cxn modelId="{4F7CD3C8-D294-714F-90A7-67927CB3C292}" type="presParOf" srcId="{A4AFE9B6-C1E8-C44E-BB79-2DF86C9B2759}" destId="{2A487DC9-50FE-FF47-BC4D-6F0CFE62C65D}" srcOrd="1" destOrd="0" presId="urn:microsoft.com/office/officeart/2005/8/layout/vList2"/>
     <dgm:cxn modelId="{55899233-F114-A445-92DD-092505EBC064}" type="presParOf" srcId="{A4AFE9B6-C1E8-C44E-BB79-2DF86C9B2759}" destId="{1632DD7E-BEBD-F241-9BFD-6A524AA43AC9}" srcOrd="2" destOrd="0" presId="urn:microsoft.com/office/officeart/2005/8/layout/vList2"/>
@@ -1425,7 +1486,7 @@
         </a:bodyPr>
         <a:lstStyle/>
         <a:p>
-          <a:pPr marL="0" lvl="0" indent="0" algn="l" defTabSz="1155700">
+          <a:pPr lvl="0" algn="l" defTabSz="1155700">
             <a:lnSpc>
               <a:spcPct val="90000"/>
             </a:lnSpc>
@@ -1435,7 +1496,6 @@
             <a:spcAft>
               <a:spcPct val="35000"/>
             </a:spcAft>
-            <a:buNone/>
           </a:pPr>
           <a:r>
             <a:rPr lang="en-US" sz="2600" kern="1200" dirty="0"/>
@@ -1517,7 +1577,7 @@
         </a:bodyPr>
         <a:lstStyle/>
         <a:p>
-          <a:pPr marL="0" lvl="0" indent="0" algn="l" defTabSz="1155700">
+          <a:pPr lvl="0" algn="l" defTabSz="1155700">
             <a:lnSpc>
               <a:spcPct val="90000"/>
             </a:lnSpc>
@@ -1527,7 +1587,6 @@
             <a:spcAft>
               <a:spcPct val="35000"/>
             </a:spcAft>
-            <a:buNone/>
           </a:pPr>
           <a:r>
             <a:rPr lang="en-US" sz="2600" kern="1200"/>
@@ -1587,7 +1646,7 @@
             <a:spcAft>
               <a:spcPct val="20000"/>
             </a:spcAft>
-            <a:buChar char="•"/>
+            <a:buChar char="••"/>
           </a:pPr>
           <a:r>
             <a:rPr lang="en-US" sz="2000" kern="1200" dirty="0"/>
@@ -1637,7 +1696,7 @@
             <a:spcAft>
               <a:spcPct val="20000"/>
             </a:spcAft>
-            <a:buChar char="•"/>
+            <a:buChar char="••"/>
           </a:pPr>
           <a:r>
             <a:rPr lang="en-US" sz="2000" kern="1200"/>
@@ -1719,7 +1778,7 @@
         </a:bodyPr>
         <a:lstStyle/>
         <a:p>
-          <a:pPr marL="0" lvl="0" indent="0" algn="l" defTabSz="1155700">
+          <a:pPr lvl="0" algn="l" defTabSz="1155700">
             <a:lnSpc>
               <a:spcPct val="90000"/>
             </a:lnSpc>
@@ -1729,7 +1788,6 @@
             <a:spcAft>
               <a:spcPct val="35000"/>
             </a:spcAft>
-            <a:buNone/>
           </a:pPr>
           <a:r>
             <a:rPr lang="en-US" sz="2600" kern="1200"/>
@@ -1790,7 +1848,7 @@
               <a:spcPct val="20000"/>
             </a:spcAft>
             <a:buFont typeface="Arial" panose="020B0604020202020204" pitchFamily="34" charset="0"/>
-            <a:buChar char="•"/>
+            <a:buChar char="••"/>
           </a:pPr>
           <a:r>
             <a:rPr lang="en-US" sz="2000" kern="1200" dirty="0"/>
@@ -1872,7 +1930,7 @@
         </a:bodyPr>
         <a:lstStyle/>
         <a:p>
-          <a:pPr marL="0" lvl="0" indent="0" algn="l" defTabSz="1155700">
+          <a:pPr lvl="0" algn="l" defTabSz="1155700">
             <a:lnSpc>
               <a:spcPct val="90000"/>
             </a:lnSpc>
@@ -1882,7 +1940,6 @@
             <a:spcAft>
               <a:spcPct val="35000"/>
             </a:spcAft>
-            <a:buNone/>
           </a:pPr>
           <a:r>
             <a:rPr lang="en-US" sz="2600" kern="1200"/>
@@ -1942,7 +1999,7 @@
             <a:spcAft>
               <a:spcPct val="20000"/>
             </a:spcAft>
-            <a:buChar char="•"/>
+            <a:buChar char="••"/>
           </a:pPr>
           <a:r>
             <a:rPr lang="en-US" sz="2000" kern="1200"/>
@@ -3242,7 +3299,7 @@
           <a:p>
             <a:fld id="{5D9DE299-B73E-E44B-8D0C-0FD9BD5BC9F2}" type="datetimeFigureOut">
               <a:rPr lang="en-US" smtClean="0"/>
-              <a:t>1/22/22</a:t>
+              <a:t>1/25/2022</a:t>
             </a:fld>
             <a:endParaRPr lang="en-US"/>
           </a:p>
@@ -4317,7 +4374,7 @@
           <a:p>
             <a:fld id="{7114D214-C183-6D46-8547-9C966D23E717}" type="datetimeFigureOut">
               <a:rPr lang="en-US" smtClean="0"/>
-              <a:t>1/22/22</a:t>
+              <a:t>1/25/2022</a:t>
             </a:fld>
             <a:endParaRPr lang="en-US"/>
           </a:p>
@@ -4568,7 +4625,7 @@
           <a:p>
             <a:fld id="{7114D214-C183-6D46-8547-9C966D23E717}" type="datetimeFigureOut">
               <a:rPr lang="en-US" smtClean="0"/>
-              <a:t>1/22/22</a:t>
+              <a:t>1/25/2022</a:t>
             </a:fld>
             <a:endParaRPr lang="en-US"/>
           </a:p>
@@ -4882,7 +4939,7 @@
           <a:p>
             <a:fld id="{7114D214-C183-6D46-8547-9C966D23E717}" type="datetimeFigureOut">
               <a:rPr lang="en-US" smtClean="0"/>
-              <a:t>1/22/22</a:t>
+              <a:t>1/25/2022</a:t>
             </a:fld>
             <a:endParaRPr lang="en-US"/>
           </a:p>
@@ -5209,7 +5266,7 @@
           <a:p>
             <a:fld id="{7114D214-C183-6D46-8547-9C966D23E717}" type="datetimeFigureOut">
               <a:rPr lang="en-US" smtClean="0"/>
-              <a:t>1/22/22</a:t>
+              <a:t>1/25/2022</a:t>
             </a:fld>
             <a:endParaRPr lang="en-US"/>
           </a:p>
@@ -5523,7 +5580,7 @@
           <a:p>
             <a:fld id="{7114D214-C183-6D46-8547-9C966D23E717}" type="datetimeFigureOut">
               <a:rPr lang="en-US" smtClean="0"/>
-              <a:t>1/22/22</a:t>
+              <a:t>1/25/2022</a:t>
             </a:fld>
             <a:endParaRPr lang="en-US"/>
           </a:p>
@@ -5910,7 +5967,7 @@
           <a:p>
             <a:fld id="{7114D214-C183-6D46-8547-9C966D23E717}" type="datetimeFigureOut">
               <a:rPr lang="en-US" smtClean="0"/>
-              <a:t>1/22/22</a:t>
+              <a:t>1/25/2022</a:t>
             </a:fld>
             <a:endParaRPr lang="en-US"/>
           </a:p>
@@ -6080,7 +6137,7 @@
           <a:p>
             <a:fld id="{7114D214-C183-6D46-8547-9C966D23E717}" type="datetimeFigureOut">
               <a:rPr lang="en-US" smtClean="0"/>
-              <a:t>1/22/22</a:t>
+              <a:t>1/25/2022</a:t>
             </a:fld>
             <a:endParaRPr lang="en-US"/>
           </a:p>
@@ -6260,7 +6317,7 @@
           <a:p>
             <a:fld id="{7114D214-C183-6D46-8547-9C966D23E717}" type="datetimeFigureOut">
               <a:rPr lang="en-US" smtClean="0"/>
-              <a:t>1/22/22</a:t>
+              <a:t>1/25/2022</a:t>
             </a:fld>
             <a:endParaRPr lang="en-US"/>
           </a:p>
@@ -6436,7 +6493,7 @@
           <a:p>
             <a:fld id="{7114D214-C183-6D46-8547-9C966D23E717}" type="datetimeFigureOut">
               <a:rPr lang="en-US" smtClean="0"/>
-              <a:t>1/22/22</a:t>
+              <a:t>1/25/2022</a:t>
             </a:fld>
             <a:endParaRPr lang="en-US"/>
           </a:p>
@@ -6683,7 +6740,7 @@
           <a:p>
             <a:fld id="{7114D214-C183-6D46-8547-9C966D23E717}" type="datetimeFigureOut">
               <a:rPr lang="en-US" smtClean="0"/>
-              <a:t>1/22/22</a:t>
+              <a:t>1/25/2022</a:t>
             </a:fld>
             <a:endParaRPr lang="en-US"/>
           </a:p>
@@ -6915,7 +6972,7 @@
           <a:p>
             <a:fld id="{7114D214-C183-6D46-8547-9C966D23E717}" type="datetimeFigureOut">
               <a:rPr lang="en-US" smtClean="0"/>
-              <a:t>1/22/22</a:t>
+              <a:t>1/25/2022</a:t>
             </a:fld>
             <a:endParaRPr lang="en-US"/>
           </a:p>
@@ -7289,7 +7346,7 @@
           <a:p>
             <a:fld id="{7114D214-C183-6D46-8547-9C966D23E717}" type="datetimeFigureOut">
               <a:rPr lang="en-US" smtClean="0"/>
-              <a:t>1/22/22</a:t>
+              <a:t>1/25/2022</a:t>
             </a:fld>
             <a:endParaRPr lang="en-US"/>
           </a:p>
@@ -7412,7 +7469,7 @@
           <a:p>
             <a:fld id="{7114D214-C183-6D46-8547-9C966D23E717}" type="datetimeFigureOut">
               <a:rPr lang="en-US" smtClean="0"/>
-              <a:t>1/22/22</a:t>
+              <a:t>1/25/2022</a:t>
             </a:fld>
             <a:endParaRPr lang="en-US"/>
           </a:p>
@@ -7507,7 +7564,7 @@
           <a:p>
             <a:fld id="{7114D214-C183-6D46-8547-9C966D23E717}" type="datetimeFigureOut">
               <a:rPr lang="en-US" smtClean="0"/>
-              <a:t>1/22/22</a:t>
+              <a:t>1/25/2022</a:t>
             </a:fld>
             <a:endParaRPr lang="en-US"/>
           </a:p>
@@ -7762,7 +7819,7 @@
           <a:p>
             <a:fld id="{7114D214-C183-6D46-8547-9C966D23E717}" type="datetimeFigureOut">
               <a:rPr lang="en-US" smtClean="0"/>
-              <a:t>1/22/22</a:t>
+              <a:t>1/25/2022</a:t>
             </a:fld>
             <a:endParaRPr lang="en-US"/>
           </a:p>
@@ -8025,7 +8082,7 @@
           <a:p>
             <a:fld id="{7114D214-C183-6D46-8547-9C966D23E717}" type="datetimeFigureOut">
               <a:rPr lang="en-US" smtClean="0"/>
-              <a:t>1/22/22</a:t>
+              <a:t>1/25/2022</a:t>
             </a:fld>
             <a:endParaRPr lang="en-US"/>
           </a:p>
@@ -8770,7 +8827,7 @@
           <a:p>
             <a:fld id="{7114D214-C183-6D46-8547-9C966D23E717}" type="datetimeFigureOut">
               <a:rPr lang="en-US" smtClean="0"/>
-              <a:t>1/22/22</a:t>
+              <a:t>1/25/2022</a:t>
             </a:fld>
             <a:endParaRPr lang="en-US"/>
           </a:p>
@@ -9593,7 +9650,7 @@
                 <a16:creationId xmlns:a16="http://schemas.microsoft.com/office/drawing/2014/main" id="{64FA5DFF-7FE6-4855-84E6-DFA78EE978BD}"/>
               </a:ext>
               <a:ext uri="{C183D7F6-B498-43B3-948B-1728B52AA6E4}">
-                <adec:decorative xmlns:adec="http://schemas.microsoft.com/office/drawing/2017/decorative" val="1"/>
+                <adec:decorative xmlns:adec="http://schemas.microsoft.com/office/drawing/2017/decorative" xmlns="" val="1"/>
               </a:ext>
             </a:extLst>
           </p:cNvPr>
@@ -9645,7 +9702,7 @@
                 <a16:creationId xmlns:a16="http://schemas.microsoft.com/office/drawing/2014/main" id="{2AFD8CBA-54A3-4363-991B-B9C631BBFA74}"/>
               </a:ext>
               <a:ext uri="{C183D7F6-B498-43B3-948B-1728B52AA6E4}">
-                <adec:decorative xmlns:adec="http://schemas.microsoft.com/office/drawing/2017/decorative" val="1"/>
+                <adec:decorative xmlns:adec="http://schemas.microsoft.com/office/drawing/2017/decorative" xmlns="" val="1"/>
               </a:ext>
             </a:extLst>
           </p:cNvPr>
@@ -9697,7 +9754,7 @@
                 <a16:creationId xmlns:a16="http://schemas.microsoft.com/office/drawing/2014/main" id="{3F088236-D655-4F88-B238-E16762358025}"/>
               </a:ext>
               <a:ext uri="{C183D7F6-B498-43B3-948B-1728B52AA6E4}">
-                <adec:decorative xmlns:adec="http://schemas.microsoft.com/office/drawing/2017/decorative" val="1"/>
+                <adec:decorative xmlns:adec="http://schemas.microsoft.com/office/drawing/2017/decorative" xmlns="" val="1"/>
               </a:ext>
             </a:extLst>
           </p:cNvPr>
@@ -9777,7 +9834,7 @@
                 <a16:creationId xmlns:a16="http://schemas.microsoft.com/office/drawing/2014/main" id="{3DAC0C92-199E-475C-9390-119A9B027276}"/>
               </a:ext>
               <a:ext uri="{C183D7F6-B498-43B3-948B-1728B52AA6E4}">
-                <adec:decorative xmlns:adec="http://schemas.microsoft.com/office/drawing/2017/decorative" val="1"/>
+                <adec:decorative xmlns:adec="http://schemas.microsoft.com/office/drawing/2017/decorative" xmlns="" val="1"/>
               </a:ext>
             </a:extLst>
           </p:cNvPr>
@@ -9857,7 +9914,7 @@
                 <a16:creationId xmlns:a16="http://schemas.microsoft.com/office/drawing/2014/main" id="{C4CFB339-0ED8-4FE2-9EF1-6D1375B8499B}"/>
               </a:ext>
               <a:ext uri="{C183D7F6-B498-43B3-948B-1728B52AA6E4}">
-                <adec:decorative xmlns:adec="http://schemas.microsoft.com/office/drawing/2017/decorative" val="1"/>
+                <adec:decorative xmlns:adec="http://schemas.microsoft.com/office/drawing/2017/decorative" xmlns="" val="1"/>
               </a:ext>
             </a:extLst>
           </p:cNvPr>
@@ -9915,7 +9972,7 @@
                 <a16:creationId xmlns:a16="http://schemas.microsoft.com/office/drawing/2014/main" id="{31896C80-2069-4431-9C19-83B913734490}"/>
               </a:ext>
               <a:ext uri="{C183D7F6-B498-43B3-948B-1728B52AA6E4}">
-                <adec:decorative xmlns:adec="http://schemas.microsoft.com/office/drawing/2017/decorative" val="1"/>
+                <adec:decorative xmlns:adec="http://schemas.microsoft.com/office/drawing/2017/decorative" xmlns="" val="1"/>
               </a:ext>
             </a:extLst>
           </p:cNvPr>
@@ -9996,7 +10053,7 @@
                 <a16:creationId xmlns:a16="http://schemas.microsoft.com/office/drawing/2014/main" id="{BF120A21-0841-4823-B0C4-28AEBCEF9B78}"/>
               </a:ext>
               <a:ext uri="{C183D7F6-B498-43B3-948B-1728B52AA6E4}">
-                <adec:decorative xmlns:adec="http://schemas.microsoft.com/office/drawing/2017/decorative" val="1"/>
+                <adec:decorative xmlns:adec="http://schemas.microsoft.com/office/drawing/2017/decorative" xmlns="" val="1"/>
               </a:ext>
             </a:extLst>
           </p:cNvPr>
@@ -10078,7 +10135,7 @@
                 <a16:creationId xmlns:a16="http://schemas.microsoft.com/office/drawing/2014/main" id="{DBB05BAE-BBD3-4289-899F-A6851503C6B0}"/>
               </a:ext>
               <a:ext uri="{C183D7F6-B498-43B3-948B-1728B52AA6E4}">
-                <adec:decorative xmlns:adec="http://schemas.microsoft.com/office/drawing/2017/decorative" val="1"/>
+                <adec:decorative xmlns:adec="http://schemas.microsoft.com/office/drawing/2017/decorative" xmlns="" val="1"/>
               </a:ext>
             </a:extLst>
           </p:cNvPr>
@@ -10158,7 +10215,7 @@
                 <a16:creationId xmlns:a16="http://schemas.microsoft.com/office/drawing/2014/main" id="{9874D11C-36F5-4BBE-A490-019A54E953B0}"/>
               </a:ext>
               <a:ext uri="{C183D7F6-B498-43B3-948B-1728B52AA6E4}">
-                <adec:decorative xmlns:adec="http://schemas.microsoft.com/office/drawing/2017/decorative" val="1"/>
+                <adec:decorative xmlns:adec="http://schemas.microsoft.com/office/drawing/2017/decorative" xmlns="" val="1"/>
               </a:ext>
             </a:extLst>
           </p:cNvPr>
@@ -10254,7 +10311,7 @@
                 <a16:creationId xmlns:a16="http://schemas.microsoft.com/office/drawing/2014/main" id="{1DA27254-207B-4B52-973B-03A6D7C253A8}"/>
               </a:ext>
               <a:ext uri="{C183D7F6-B498-43B3-948B-1728B52AA6E4}">
-                <adec:decorative xmlns:adec="http://schemas.microsoft.com/office/drawing/2017/decorative" val="1"/>
+                <adec:decorative xmlns:adec="http://schemas.microsoft.com/office/drawing/2017/decorative" xmlns="" val="1"/>
               </a:ext>
             </a:extLst>
           </p:cNvPr>
@@ -10349,7 +10406,7 @@
                 <a16:creationId xmlns:a16="http://schemas.microsoft.com/office/drawing/2014/main" id="{AE3358E8-FEB4-4E5C-903A-92C75E6BDD18}"/>
               </a:ext>
               <a:ext uri="{C183D7F6-B498-43B3-948B-1728B52AA6E4}">
-                <adec:decorative xmlns:adec="http://schemas.microsoft.com/office/drawing/2017/decorative" val="1"/>
+                <adec:decorative xmlns:adec="http://schemas.microsoft.com/office/drawing/2017/decorative" xmlns="" val="1"/>
               </a:ext>
             </a:extLst>
           </p:cNvPr>
@@ -10380,7 +10437,7 @@
                   <a16:creationId xmlns:a16="http://schemas.microsoft.com/office/drawing/2014/main" id="{65FE9BA5-5847-4FF3-960A-4E3AC28E3756}"/>
                 </a:ext>
                 <a:ext uri="{C183D7F6-B498-43B3-948B-1728B52AA6E4}">
-                  <adec:decorative xmlns:adec="http://schemas.microsoft.com/office/drawing/2017/decorative" val="1"/>
+                  <adec:decorative xmlns:adec="http://schemas.microsoft.com/office/drawing/2017/decorative" xmlns="" val="1"/>
                 </a:ext>
               </a:extLst>
             </p:cNvPr>
@@ -10432,7 +10489,7 @@
                   <a16:creationId xmlns:a16="http://schemas.microsoft.com/office/drawing/2014/main" id="{76D98C19-CACB-4DEB-9AA7-5E1D776DBCE9}"/>
                 </a:ext>
                 <a:ext uri="{C183D7F6-B498-43B3-948B-1728B52AA6E4}">
-                  <adec:decorative xmlns:adec="http://schemas.microsoft.com/office/drawing/2017/decorative" val="1"/>
+                  <adec:decorative xmlns:adec="http://schemas.microsoft.com/office/drawing/2017/decorative" xmlns="" val="1"/>
                 </a:ext>
               </a:extLst>
             </p:cNvPr>
@@ -10484,7 +10541,7 @@
                   <a16:creationId xmlns:a16="http://schemas.microsoft.com/office/drawing/2014/main" id="{8EA0C28F-AA7D-46C7-8D8A-CE97E7EB0712}"/>
                 </a:ext>
                 <a:ext uri="{C183D7F6-B498-43B3-948B-1728B52AA6E4}">
-                  <adec:decorative xmlns:adec="http://schemas.microsoft.com/office/drawing/2017/decorative" val="1"/>
+                  <adec:decorative xmlns:adec="http://schemas.microsoft.com/office/drawing/2017/decorative" xmlns="" val="1"/>
                 </a:ext>
               </a:extLst>
             </p:cNvPr>
@@ -10562,7 +10619,7 @@
                   <a16:creationId xmlns:a16="http://schemas.microsoft.com/office/drawing/2014/main" id="{50B7A449-3821-4275-97E9-6B1FF91DE1EA}"/>
                 </a:ext>
                 <a:ext uri="{C183D7F6-B498-43B3-948B-1728B52AA6E4}">
-                  <adec:decorative xmlns:adec="http://schemas.microsoft.com/office/drawing/2017/decorative" val="1"/>
+                  <adec:decorative xmlns:adec="http://schemas.microsoft.com/office/drawing/2017/decorative" xmlns="" val="1"/>
                 </a:ext>
               </a:extLst>
             </p:cNvPr>
@@ -10640,7 +10697,7 @@
                   <a16:creationId xmlns:a16="http://schemas.microsoft.com/office/drawing/2014/main" id="{D15285ED-C1E9-4539-9551-2D9D3B897DBB}"/>
                 </a:ext>
                 <a:ext uri="{C183D7F6-B498-43B3-948B-1728B52AA6E4}">
-                  <adec:decorative xmlns:adec="http://schemas.microsoft.com/office/drawing/2017/decorative" val="1"/>
+                  <adec:decorative xmlns:adec="http://schemas.microsoft.com/office/drawing/2017/decorative" xmlns="" val="1"/>
                 </a:ext>
               </a:extLst>
             </p:cNvPr>
@@ -10696,7 +10753,7 @@
                   <a16:creationId xmlns:a16="http://schemas.microsoft.com/office/drawing/2014/main" id="{A57A772B-029C-402F-8961-04AD1B611248}"/>
                 </a:ext>
                 <a:ext uri="{C183D7F6-B498-43B3-948B-1728B52AA6E4}">
-                  <adec:decorative xmlns:adec="http://schemas.microsoft.com/office/drawing/2017/decorative" val="1"/>
+                  <adec:decorative xmlns:adec="http://schemas.microsoft.com/office/drawing/2017/decorative" xmlns="" val="1"/>
                 </a:ext>
               </a:extLst>
             </p:cNvPr>
@@ -10775,7 +10832,7 @@
                   <a16:creationId xmlns:a16="http://schemas.microsoft.com/office/drawing/2014/main" id="{43A98072-A351-47FB-8807-1EEDBF77E34C}"/>
                 </a:ext>
                 <a:ext uri="{C183D7F6-B498-43B3-948B-1728B52AA6E4}">
-                  <adec:decorative xmlns:adec="http://schemas.microsoft.com/office/drawing/2017/decorative" val="1"/>
+                  <adec:decorative xmlns:adec="http://schemas.microsoft.com/office/drawing/2017/decorative" xmlns="" val="1"/>
                 </a:ext>
               </a:extLst>
             </p:cNvPr>
@@ -10855,7 +10912,7 @@
                   <a16:creationId xmlns:a16="http://schemas.microsoft.com/office/drawing/2014/main" id="{3BC2C561-1ADE-495B-A04A-92DE414F5D56}"/>
                 </a:ext>
                 <a:ext uri="{C183D7F6-B498-43B3-948B-1728B52AA6E4}">
-                  <adec:decorative xmlns:adec="http://schemas.microsoft.com/office/drawing/2017/decorative" val="1"/>
+                  <adec:decorative xmlns:adec="http://schemas.microsoft.com/office/drawing/2017/decorative" xmlns="" val="1"/>
                 </a:ext>
               </a:extLst>
             </p:cNvPr>
@@ -10933,7 +10990,7 @@
                   <a16:creationId xmlns:a16="http://schemas.microsoft.com/office/drawing/2014/main" id="{FE633B79-4994-47EC-9479-56BA3E3A5808}"/>
                 </a:ext>
                 <a:ext uri="{C183D7F6-B498-43B3-948B-1728B52AA6E4}">
-                  <adec:decorative xmlns:adec="http://schemas.microsoft.com/office/drawing/2017/decorative" val="1"/>
+                  <adec:decorative xmlns:adec="http://schemas.microsoft.com/office/drawing/2017/decorative" xmlns="" val="1"/>
                 </a:ext>
               </a:extLst>
             </p:cNvPr>
@@ -10990,7 +11047,7 @@
                 <a16:creationId xmlns:a16="http://schemas.microsoft.com/office/drawing/2014/main" id="{D6188152-70CA-4742-AA0D-863A7FDB4793}"/>
               </a:ext>
               <a:ext uri="{C183D7F6-B498-43B3-948B-1728B52AA6E4}">
-                <adec:decorative xmlns:adec="http://schemas.microsoft.com/office/drawing/2017/decorative" val="1"/>
+                <adec:decorative xmlns:adec="http://schemas.microsoft.com/office/drawing/2017/decorative" xmlns="" val="1"/>
               </a:ext>
             </a:extLst>
           </p:cNvPr>
@@ -11244,7 +11301,7 @@
                 <a16:creationId xmlns:a16="http://schemas.microsoft.com/office/drawing/2014/main" id="{D94A7024-D948-494D-8920-BBA2DA07D15B}"/>
               </a:ext>
               <a:ext uri="{C183D7F6-B498-43B3-948B-1728B52AA6E4}">
-                <adec:decorative xmlns:adec="http://schemas.microsoft.com/office/drawing/2017/decorative" val="1"/>
+                <adec:decorative xmlns:adec="http://schemas.microsoft.com/office/drawing/2017/decorative" xmlns="" val="1"/>
               </a:ext>
             </a:extLst>
           </p:cNvPr>
@@ -11371,13 +11428,62 @@
               <a:buChar char="•"/>
             </a:pPr>
             <a:r>
+              <a:rPr lang="en-US" dirty="0" smtClean="0">
+                <a:solidFill>
+                  <a:schemeClr val="accent1"/>
+                </a:solidFill>
+              </a:rPr>
+              <a:t>For “Number of weeks predicted to chart” we first did Linear regression for a numerical outcome</a:t>
+            </a:r>
+          </a:p>
+          <a:p>
+            <a:pPr marL="285750" indent="-285750">
+              <a:buFont typeface="Arial" panose="020B0604020202020204" pitchFamily="34" charset="0"/>
+              <a:buChar char="•"/>
+            </a:pPr>
+            <a:r>
+              <a:rPr lang="en-US" dirty="0" smtClean="0">
+                <a:solidFill>
+                  <a:schemeClr val="accent1"/>
+                </a:solidFill>
+              </a:rPr>
+              <a:t>Errors </a:t>
+            </a:r>
+            <a:r>
               <a:rPr lang="en-US" dirty="0">
                 <a:solidFill>
                   <a:schemeClr val="accent1"/>
                 </a:solidFill>
               </a:rPr>
-              <a:t>Errors from model testing, with Linear Regression (training and testing scores below 0.010)</a:t>
+              <a:t>from model testing, with Linear Regression (training and testing scores below 0.010</a:t>
             </a:r>
+            <a:r>
+              <a:rPr lang="en-US" dirty="0" smtClean="0">
+                <a:solidFill>
+                  <a:schemeClr val="accent1"/>
+                </a:solidFill>
+              </a:rPr>
+              <a:t>)</a:t>
+            </a:r>
+          </a:p>
+          <a:p>
+            <a:pPr marL="285750" indent="-285750">
+              <a:buFont typeface="Arial" panose="020B0604020202020204" pitchFamily="34" charset="0"/>
+              <a:buChar char="•"/>
+            </a:pPr>
+            <a:r>
+              <a:rPr lang="en-US" dirty="0" smtClean="0">
+                <a:solidFill>
+                  <a:schemeClr val="accent1"/>
+                </a:solidFill>
+              </a:rPr>
+              <a:t>Decided to bin weeks into 4 categories</a:t>
+            </a:r>
+            <a:endParaRPr lang="en-US" dirty="0">
+              <a:solidFill>
+                <a:schemeClr val="accent1"/>
+              </a:solidFill>
+            </a:endParaRPr>
           </a:p>
           <a:p>
             <a:pPr marL="285750" indent="-285750">
@@ -11438,7 +11544,7 @@
                 <a16:creationId xmlns:a16="http://schemas.microsoft.com/office/drawing/2014/main" id="{0565C35A-C6FA-4269-822E-6DB5B9C48882}"/>
               </a:ext>
               <a:ext uri="{C183D7F6-B498-43B3-948B-1728B52AA6E4}">
-                <adec:decorative xmlns:adec="http://schemas.microsoft.com/office/drawing/2017/decorative" val="1"/>
+                <adec:decorative xmlns:adec="http://schemas.microsoft.com/office/drawing/2017/decorative" xmlns="" val="1"/>
               </a:ext>
             </a:extLst>
           </p:cNvPr>
@@ -11469,7 +11575,7 @@
                   <a16:creationId xmlns:a16="http://schemas.microsoft.com/office/drawing/2014/main" id="{F8BBEF76-F066-4551-8A87-AAFD9969E529}"/>
                 </a:ext>
                 <a:ext uri="{C183D7F6-B498-43B3-948B-1728B52AA6E4}">
-                  <adec:decorative xmlns:adec="http://schemas.microsoft.com/office/drawing/2017/decorative" val="1"/>
+                  <adec:decorative xmlns:adec="http://schemas.microsoft.com/office/drawing/2017/decorative" xmlns="" val="1"/>
                 </a:ext>
               </a:extLst>
             </p:cNvPr>
@@ -11522,7 +11628,7 @@
                   <a16:creationId xmlns:a16="http://schemas.microsoft.com/office/drawing/2014/main" id="{97E701E2-9884-4313-A922-224D075A7C67}"/>
                 </a:ext>
                 <a:ext uri="{C183D7F6-B498-43B3-948B-1728B52AA6E4}">
-                  <adec:decorative xmlns:adec="http://schemas.microsoft.com/office/drawing/2017/decorative" val="1"/>
+                  <adec:decorative xmlns:adec="http://schemas.microsoft.com/office/drawing/2017/decorative" xmlns="" val="1"/>
                 </a:ext>
               </a:extLst>
             </p:cNvPr>
@@ -11575,7 +11681,7 @@
                   <a16:creationId xmlns:a16="http://schemas.microsoft.com/office/drawing/2014/main" id="{32C9DF5B-371A-4170-9F46-B6EE7EF028C4}"/>
                 </a:ext>
                 <a:ext uri="{C183D7F6-B498-43B3-948B-1728B52AA6E4}">
-                  <adec:decorative xmlns:adec="http://schemas.microsoft.com/office/drawing/2017/decorative" val="1"/>
+                  <adec:decorative xmlns:adec="http://schemas.microsoft.com/office/drawing/2017/decorative" xmlns="" val="1"/>
                 </a:ext>
               </a:extLst>
             </p:cNvPr>
@@ -11653,7 +11759,7 @@
                   <a16:creationId xmlns:a16="http://schemas.microsoft.com/office/drawing/2014/main" id="{00EAEF78-4C36-4EC9-855A-C27427C36B8F}"/>
                 </a:ext>
                 <a:ext uri="{C183D7F6-B498-43B3-948B-1728B52AA6E4}">
-                  <adec:decorative xmlns:adec="http://schemas.microsoft.com/office/drawing/2017/decorative" val="1"/>
+                  <adec:decorative xmlns:adec="http://schemas.microsoft.com/office/drawing/2017/decorative" xmlns="" val="1"/>
                 </a:ext>
               </a:extLst>
             </p:cNvPr>
@@ -11731,7 +11837,7 @@
                   <a16:creationId xmlns:a16="http://schemas.microsoft.com/office/drawing/2014/main" id="{5E397A22-38A0-4816-926B-740F8E1899B2}"/>
                 </a:ext>
                 <a:ext uri="{C183D7F6-B498-43B3-948B-1728B52AA6E4}">
-                  <adec:decorative xmlns:adec="http://schemas.microsoft.com/office/drawing/2017/decorative" val="1"/>
+                  <adec:decorative xmlns:adec="http://schemas.microsoft.com/office/drawing/2017/decorative" xmlns="" val="1"/>
                 </a:ext>
               </a:extLst>
             </p:cNvPr>
@@ -11787,7 +11893,7 @@
                   <a16:creationId xmlns:a16="http://schemas.microsoft.com/office/drawing/2014/main" id="{A4756C8A-87DB-494D-999F-E6C0EB0BDA13}"/>
                 </a:ext>
                 <a:ext uri="{C183D7F6-B498-43B3-948B-1728B52AA6E4}">
-                  <adec:decorative xmlns:adec="http://schemas.microsoft.com/office/drawing/2017/decorative" val="1"/>
+                  <adec:decorative xmlns:adec="http://schemas.microsoft.com/office/drawing/2017/decorative" xmlns="" val="1"/>
                 </a:ext>
               </a:extLst>
             </p:cNvPr>
@@ -11866,7 +11972,7 @@
                   <a16:creationId xmlns:a16="http://schemas.microsoft.com/office/drawing/2014/main" id="{FB60A164-1613-43A9-A23E-870E89DD9028}"/>
                 </a:ext>
                 <a:ext uri="{C183D7F6-B498-43B3-948B-1728B52AA6E4}">
-                  <adec:decorative xmlns:adec="http://schemas.microsoft.com/office/drawing/2017/decorative" val="1"/>
+                  <adec:decorative xmlns:adec="http://schemas.microsoft.com/office/drawing/2017/decorative" xmlns="" val="1"/>
                 </a:ext>
               </a:extLst>
             </p:cNvPr>
@@ -11946,7 +12052,7 @@
                   <a16:creationId xmlns:a16="http://schemas.microsoft.com/office/drawing/2014/main" id="{CA0CF5DE-8A99-4138-A0F0-C84DA0C7322F}"/>
                 </a:ext>
                 <a:ext uri="{C183D7F6-B498-43B3-948B-1728B52AA6E4}">
-                  <adec:decorative xmlns:adec="http://schemas.microsoft.com/office/drawing/2017/decorative" val="1"/>
+                  <adec:decorative xmlns:adec="http://schemas.microsoft.com/office/drawing/2017/decorative" xmlns="" val="1"/>
                 </a:ext>
               </a:extLst>
             </p:cNvPr>
@@ -12024,7 +12130,7 @@
                   <a16:creationId xmlns:a16="http://schemas.microsoft.com/office/drawing/2014/main" id="{B41D911B-1F2A-43C3-BDE4-77A1F3D85455}"/>
                 </a:ext>
                 <a:ext uri="{C183D7F6-B498-43B3-948B-1728B52AA6E4}">
-                  <adec:decorative xmlns:adec="http://schemas.microsoft.com/office/drawing/2017/decorative" val="1"/>
+                  <adec:decorative xmlns:adec="http://schemas.microsoft.com/office/drawing/2017/decorative" xmlns="" val="1"/>
                 </a:ext>
               </a:extLst>
             </p:cNvPr>
@@ -12080,7 +12186,7 @@
                   <a16:creationId xmlns:a16="http://schemas.microsoft.com/office/drawing/2014/main" id="{A429A86E-CFC2-4521-9A58-DF4BF96D9505}"/>
                 </a:ext>
                 <a:ext uri="{C183D7F6-B498-43B3-948B-1728B52AA6E4}">
-                  <adec:decorative xmlns:adec="http://schemas.microsoft.com/office/drawing/2017/decorative" val="1"/>
+                  <adec:decorative xmlns:adec="http://schemas.microsoft.com/office/drawing/2017/decorative" xmlns="" val="1"/>
                 </a:ext>
               </a:extLst>
             </p:cNvPr>
@@ -12137,7 +12243,7 @@
                 <a16:creationId xmlns:a16="http://schemas.microsoft.com/office/drawing/2014/main" id="{21029ED5-F105-4DD2-99C8-1E4422817978}"/>
               </a:ext>
               <a:ext uri="{C183D7F6-B498-43B3-948B-1728B52AA6E4}">
-                <adec:decorative xmlns:adec="http://schemas.microsoft.com/office/drawing/2017/decorative" val="1"/>
+                <adec:decorative xmlns:adec="http://schemas.microsoft.com/office/drawing/2017/decorative" xmlns="" val="1"/>
               </a:ext>
             </a:extLst>
           </p:cNvPr>
@@ -12197,7 +12303,7 @@
                 <a16:creationId xmlns:a16="http://schemas.microsoft.com/office/drawing/2014/main" id="{2D621E68-BF28-4A1C-B1A2-4E55E139E79A}"/>
               </a:ext>
               <a:ext uri="{C183D7F6-B498-43B3-948B-1728B52AA6E4}">
-                <adec:decorative xmlns:adec="http://schemas.microsoft.com/office/drawing/2017/decorative" val="1"/>
+                <adec:decorative xmlns:adec="http://schemas.microsoft.com/office/drawing/2017/decorative" xmlns="" val="1"/>
               </a:ext>
             </a:extLst>
           </p:cNvPr>
@@ -12228,7 +12334,7 @@
                   <a16:creationId xmlns:a16="http://schemas.microsoft.com/office/drawing/2014/main" id="{BE8BBE4D-F0DF-49B9-B75A-99DAC53ACA77}"/>
                 </a:ext>
                 <a:ext uri="{C183D7F6-B498-43B3-948B-1728B52AA6E4}">
-                  <adec:decorative xmlns:adec="http://schemas.microsoft.com/office/drawing/2017/decorative" val="1"/>
+                  <adec:decorative xmlns:adec="http://schemas.microsoft.com/office/drawing/2017/decorative" xmlns="" val="1"/>
                 </a:ext>
               </a:extLst>
             </p:cNvPr>
@@ -12280,7 +12386,7 @@
                   <a16:creationId xmlns:a16="http://schemas.microsoft.com/office/drawing/2014/main" id="{E0F07DDC-34A6-46A1-9DE9-2BBE2931A55B}"/>
                 </a:ext>
                 <a:ext uri="{C183D7F6-B498-43B3-948B-1728B52AA6E4}">
-                  <adec:decorative xmlns:adec="http://schemas.microsoft.com/office/drawing/2017/decorative" val="1"/>
+                  <adec:decorative xmlns:adec="http://schemas.microsoft.com/office/drawing/2017/decorative" xmlns="" val="1"/>
                 </a:ext>
               </a:extLst>
             </p:cNvPr>
@@ -12358,7 +12464,7 @@
                   <a16:creationId xmlns:a16="http://schemas.microsoft.com/office/drawing/2014/main" id="{2CEB2BF9-B8DB-45B9-86EA-D197B5B1AEFF}"/>
                 </a:ext>
                 <a:ext uri="{C183D7F6-B498-43B3-948B-1728B52AA6E4}">
-                  <adec:decorative xmlns:adec="http://schemas.microsoft.com/office/drawing/2017/decorative" val="1"/>
+                  <adec:decorative xmlns:adec="http://schemas.microsoft.com/office/drawing/2017/decorative" xmlns="" val="1"/>
                 </a:ext>
               </a:extLst>
             </p:cNvPr>
@@ -12436,7 +12542,7 @@
                   <a16:creationId xmlns:a16="http://schemas.microsoft.com/office/drawing/2014/main" id="{08B5BB34-3801-4E70-A981-FE007635E11D}"/>
                 </a:ext>
                 <a:ext uri="{C183D7F6-B498-43B3-948B-1728B52AA6E4}">
-                  <adec:decorative xmlns:adec="http://schemas.microsoft.com/office/drawing/2017/decorative" val="1"/>
+                  <adec:decorative xmlns:adec="http://schemas.microsoft.com/office/drawing/2017/decorative" xmlns="" val="1"/>
                 </a:ext>
               </a:extLst>
             </p:cNvPr>
@@ -12492,7 +12598,7 @@
                   <a16:creationId xmlns:a16="http://schemas.microsoft.com/office/drawing/2014/main" id="{38432A75-2CEB-463C-A8F2-ABB50A79F444}"/>
                 </a:ext>
                 <a:ext uri="{C183D7F6-B498-43B3-948B-1728B52AA6E4}">
-                  <adec:decorative xmlns:adec="http://schemas.microsoft.com/office/drawing/2017/decorative" val="1"/>
+                  <adec:decorative xmlns:adec="http://schemas.microsoft.com/office/drawing/2017/decorative" xmlns="" val="1"/>
                 </a:ext>
               </a:extLst>
             </p:cNvPr>
@@ -12571,7 +12677,7 @@
                   <a16:creationId xmlns:a16="http://schemas.microsoft.com/office/drawing/2014/main" id="{E7E850B8-C050-4597-8BEB-113FEC9A27C9}"/>
                 </a:ext>
                 <a:ext uri="{C183D7F6-B498-43B3-948B-1728B52AA6E4}">
-                  <adec:decorative xmlns:adec="http://schemas.microsoft.com/office/drawing/2017/decorative" val="1"/>
+                  <adec:decorative xmlns:adec="http://schemas.microsoft.com/office/drawing/2017/decorative" xmlns="" val="1"/>
                 </a:ext>
               </a:extLst>
             </p:cNvPr>
@@ -12651,7 +12757,7 @@
                   <a16:creationId xmlns:a16="http://schemas.microsoft.com/office/drawing/2014/main" id="{24ACC798-9CEC-4B6F-A8DD-F8E6FCCCF164}"/>
                 </a:ext>
                 <a:ext uri="{C183D7F6-B498-43B3-948B-1728B52AA6E4}">
-                  <adec:decorative xmlns:adec="http://schemas.microsoft.com/office/drawing/2017/decorative" val="1"/>
+                  <adec:decorative xmlns:adec="http://schemas.microsoft.com/office/drawing/2017/decorative" xmlns="" val="1"/>
                 </a:ext>
               </a:extLst>
             </p:cNvPr>
@@ -12729,7 +12835,7 @@
                   <a16:creationId xmlns:a16="http://schemas.microsoft.com/office/drawing/2014/main" id="{1D58A8C6-1294-4CD9-89BC-F1E981A524AA}"/>
                 </a:ext>
                 <a:ext uri="{C183D7F6-B498-43B3-948B-1728B52AA6E4}">
-                  <adec:decorative xmlns:adec="http://schemas.microsoft.com/office/drawing/2017/decorative" val="1"/>
+                  <adec:decorative xmlns:adec="http://schemas.microsoft.com/office/drawing/2017/decorative" xmlns="" val="1"/>
                 </a:ext>
               </a:extLst>
             </p:cNvPr>
@@ -12785,7 +12891,7 @@
                   <a16:creationId xmlns:a16="http://schemas.microsoft.com/office/drawing/2014/main" id="{F32F2ED6-6143-46C4-A641-72D42732B6FA}"/>
                 </a:ext>
                 <a:ext uri="{C183D7F6-B498-43B3-948B-1728B52AA6E4}">
-                  <adec:decorative xmlns:adec="http://schemas.microsoft.com/office/drawing/2017/decorative" val="1"/>
+                  <adec:decorative xmlns:adec="http://schemas.microsoft.com/office/drawing/2017/decorative" xmlns="" val="1"/>
                 </a:ext>
               </a:extLst>
             </p:cNvPr>
@@ -12842,7 +12948,7 @@
                 <a16:creationId xmlns:a16="http://schemas.microsoft.com/office/drawing/2014/main" id="{5C9652B3-A450-4ED6-8FBF-F536BA60B4D8}"/>
               </a:ext>
               <a:ext uri="{C183D7F6-B498-43B3-948B-1728B52AA6E4}">
-                <adec:decorative xmlns:adec="http://schemas.microsoft.com/office/drawing/2017/decorative" val="1"/>
+                <adec:decorative xmlns:adec="http://schemas.microsoft.com/office/drawing/2017/decorative" xmlns="" val="1"/>
               </a:ext>
             </a:extLst>
           </p:cNvPr>
@@ -13135,7 +13241,7 @@
                 <a16:creationId xmlns:a16="http://schemas.microsoft.com/office/drawing/2014/main" id="{0565C35A-C6FA-4269-822E-6DB5B9C48882}"/>
               </a:ext>
               <a:ext uri="{C183D7F6-B498-43B3-948B-1728B52AA6E4}">
-                <adec:decorative xmlns:adec="http://schemas.microsoft.com/office/drawing/2017/decorative" val="1"/>
+                <adec:decorative xmlns:adec="http://schemas.microsoft.com/office/drawing/2017/decorative" xmlns="" val="1"/>
               </a:ext>
             </a:extLst>
           </p:cNvPr>
@@ -13166,7 +13272,7 @@
                   <a16:creationId xmlns:a16="http://schemas.microsoft.com/office/drawing/2014/main" id="{F8BBEF76-F066-4551-8A87-AAFD9969E529}"/>
                 </a:ext>
                 <a:ext uri="{C183D7F6-B498-43B3-948B-1728B52AA6E4}">
-                  <adec:decorative xmlns:adec="http://schemas.microsoft.com/office/drawing/2017/decorative" val="1"/>
+                  <adec:decorative xmlns:adec="http://schemas.microsoft.com/office/drawing/2017/decorative" xmlns="" val="1"/>
                 </a:ext>
               </a:extLst>
             </p:cNvPr>
@@ -13219,7 +13325,7 @@
                   <a16:creationId xmlns:a16="http://schemas.microsoft.com/office/drawing/2014/main" id="{97E701E2-9884-4313-A922-224D075A7C67}"/>
                 </a:ext>
                 <a:ext uri="{C183D7F6-B498-43B3-948B-1728B52AA6E4}">
-                  <adec:decorative xmlns:adec="http://schemas.microsoft.com/office/drawing/2017/decorative" val="1"/>
+                  <adec:decorative xmlns:adec="http://schemas.microsoft.com/office/drawing/2017/decorative" xmlns="" val="1"/>
                 </a:ext>
               </a:extLst>
             </p:cNvPr>
@@ -13272,7 +13378,7 @@
                   <a16:creationId xmlns:a16="http://schemas.microsoft.com/office/drawing/2014/main" id="{32C9DF5B-371A-4170-9F46-B6EE7EF028C4}"/>
                 </a:ext>
                 <a:ext uri="{C183D7F6-B498-43B3-948B-1728B52AA6E4}">
-                  <adec:decorative xmlns:adec="http://schemas.microsoft.com/office/drawing/2017/decorative" val="1"/>
+                  <adec:decorative xmlns:adec="http://schemas.microsoft.com/office/drawing/2017/decorative" xmlns="" val="1"/>
                 </a:ext>
               </a:extLst>
             </p:cNvPr>
@@ -13350,7 +13456,7 @@
                   <a16:creationId xmlns:a16="http://schemas.microsoft.com/office/drawing/2014/main" id="{00EAEF78-4C36-4EC9-855A-C27427C36B8F}"/>
                 </a:ext>
                 <a:ext uri="{C183D7F6-B498-43B3-948B-1728B52AA6E4}">
-                  <adec:decorative xmlns:adec="http://schemas.microsoft.com/office/drawing/2017/decorative" val="1"/>
+                  <adec:decorative xmlns:adec="http://schemas.microsoft.com/office/drawing/2017/decorative" xmlns="" val="1"/>
                 </a:ext>
               </a:extLst>
             </p:cNvPr>
@@ -13428,7 +13534,7 @@
                   <a16:creationId xmlns:a16="http://schemas.microsoft.com/office/drawing/2014/main" id="{5E397A22-38A0-4816-926B-740F8E1899B2}"/>
                 </a:ext>
                 <a:ext uri="{C183D7F6-B498-43B3-948B-1728B52AA6E4}">
-                  <adec:decorative xmlns:adec="http://schemas.microsoft.com/office/drawing/2017/decorative" val="1"/>
+                  <adec:decorative xmlns:adec="http://schemas.microsoft.com/office/drawing/2017/decorative" xmlns="" val="1"/>
                 </a:ext>
               </a:extLst>
             </p:cNvPr>
@@ -13484,7 +13590,7 @@
                   <a16:creationId xmlns:a16="http://schemas.microsoft.com/office/drawing/2014/main" id="{A4756C8A-87DB-494D-999F-E6C0EB0BDA13}"/>
                 </a:ext>
                 <a:ext uri="{C183D7F6-B498-43B3-948B-1728B52AA6E4}">
-                  <adec:decorative xmlns:adec="http://schemas.microsoft.com/office/drawing/2017/decorative" val="1"/>
+                  <adec:decorative xmlns:adec="http://schemas.microsoft.com/office/drawing/2017/decorative" xmlns="" val="1"/>
                 </a:ext>
               </a:extLst>
             </p:cNvPr>
@@ -13563,7 +13669,7 @@
                   <a16:creationId xmlns:a16="http://schemas.microsoft.com/office/drawing/2014/main" id="{FB60A164-1613-43A9-A23E-870E89DD9028}"/>
                 </a:ext>
                 <a:ext uri="{C183D7F6-B498-43B3-948B-1728B52AA6E4}">
-                  <adec:decorative xmlns:adec="http://schemas.microsoft.com/office/drawing/2017/decorative" val="1"/>
+                  <adec:decorative xmlns:adec="http://schemas.microsoft.com/office/drawing/2017/decorative" xmlns="" val="1"/>
                 </a:ext>
               </a:extLst>
             </p:cNvPr>
@@ -13643,7 +13749,7 @@
                   <a16:creationId xmlns:a16="http://schemas.microsoft.com/office/drawing/2014/main" id="{CA0CF5DE-8A99-4138-A0F0-C84DA0C7322F}"/>
                 </a:ext>
                 <a:ext uri="{C183D7F6-B498-43B3-948B-1728B52AA6E4}">
-                  <adec:decorative xmlns:adec="http://schemas.microsoft.com/office/drawing/2017/decorative" val="1"/>
+                  <adec:decorative xmlns:adec="http://schemas.microsoft.com/office/drawing/2017/decorative" xmlns="" val="1"/>
                 </a:ext>
               </a:extLst>
             </p:cNvPr>
@@ -13721,7 +13827,7 @@
                   <a16:creationId xmlns:a16="http://schemas.microsoft.com/office/drawing/2014/main" id="{B41D911B-1F2A-43C3-BDE4-77A1F3D85455}"/>
                 </a:ext>
                 <a:ext uri="{C183D7F6-B498-43B3-948B-1728B52AA6E4}">
-                  <adec:decorative xmlns:adec="http://schemas.microsoft.com/office/drawing/2017/decorative" val="1"/>
+                  <adec:decorative xmlns:adec="http://schemas.microsoft.com/office/drawing/2017/decorative" xmlns="" val="1"/>
                 </a:ext>
               </a:extLst>
             </p:cNvPr>
@@ -13777,7 +13883,7 @@
                   <a16:creationId xmlns:a16="http://schemas.microsoft.com/office/drawing/2014/main" id="{A429A86E-CFC2-4521-9A58-DF4BF96D9505}"/>
                 </a:ext>
                 <a:ext uri="{C183D7F6-B498-43B3-948B-1728B52AA6E4}">
-                  <adec:decorative xmlns:adec="http://schemas.microsoft.com/office/drawing/2017/decorative" val="1"/>
+                  <adec:decorative xmlns:adec="http://schemas.microsoft.com/office/drawing/2017/decorative" xmlns="" val="1"/>
                 </a:ext>
               </a:extLst>
             </p:cNvPr>
@@ -13865,7 +13971,7 @@
                 <a16:creationId xmlns:a16="http://schemas.microsoft.com/office/drawing/2014/main" id="{85C2136B-77EC-41E9-BDB6-58A4AE1429B7}"/>
               </a:ext>
               <a:ext uri="{C183D7F6-B498-43B3-948B-1728B52AA6E4}">
-                <adec:decorative xmlns:adec="http://schemas.microsoft.com/office/drawing/2017/decorative" val="1"/>
+                <adec:decorative xmlns:adec="http://schemas.microsoft.com/office/drawing/2017/decorative" xmlns="" val="1"/>
               </a:ext>
             </a:extLst>
           </p:cNvPr>
@@ -13962,7 +14068,7 @@
                 <a16:creationId xmlns:a16="http://schemas.microsoft.com/office/drawing/2014/main" id="{E55891F3-A5E2-4418-8950-25FA2B731209}"/>
               </a:ext>
               <a:ext uri="{C183D7F6-B498-43B3-948B-1728B52AA6E4}">
-                <adec:decorative xmlns:adec="http://schemas.microsoft.com/office/drawing/2017/decorative" val="1"/>
+                <adec:decorative xmlns:adec="http://schemas.microsoft.com/office/drawing/2017/decorative" xmlns="" val="1"/>
               </a:ext>
             </a:extLst>
           </p:cNvPr>
@@ -14014,7 +14120,7 @@
                 <a16:creationId xmlns:a16="http://schemas.microsoft.com/office/drawing/2014/main" id="{FB1FCEB1-A7E1-417C-A7EF-AA30D5A0859F}"/>
               </a:ext>
               <a:ext uri="{C183D7F6-B498-43B3-948B-1728B52AA6E4}">
-                <adec:decorative xmlns:adec="http://schemas.microsoft.com/office/drawing/2017/decorative" val="1"/>
+                <adec:decorative xmlns:adec="http://schemas.microsoft.com/office/drawing/2017/decorative" xmlns="" val="1"/>
               </a:ext>
             </a:extLst>
           </p:cNvPr>
@@ -14066,7 +14172,7 @@
                 <a16:creationId xmlns:a16="http://schemas.microsoft.com/office/drawing/2014/main" id="{7FBCF2A6-1F18-4B68-B5D2-5B763ED4159A}"/>
               </a:ext>
               <a:ext uri="{C183D7F6-B498-43B3-948B-1728B52AA6E4}">
-                <adec:decorative xmlns:adec="http://schemas.microsoft.com/office/drawing/2017/decorative" val="1"/>
+                <adec:decorative xmlns:adec="http://schemas.microsoft.com/office/drawing/2017/decorative" xmlns="" val="1"/>
               </a:ext>
             </a:extLst>
           </p:cNvPr>
@@ -14176,7 +14282,7 @@
                 <a16:creationId xmlns:a16="http://schemas.microsoft.com/office/drawing/2014/main" id="{FF3A27FB-A693-4A75-951E-0C77CD98F032}"/>
               </a:ext>
               <a:ext uri="{C183D7F6-B498-43B3-948B-1728B52AA6E4}">
-                <adec:decorative xmlns:adec="http://schemas.microsoft.com/office/drawing/2017/decorative" val="1"/>
+                <adec:decorative xmlns:adec="http://schemas.microsoft.com/office/drawing/2017/decorative" xmlns="" val="1"/>
               </a:ext>
             </a:extLst>
           </p:cNvPr>

</xml_diff>